<commit_message>
Update Group 15 Major Project Review 1 Presentation.pptx
</commit_message>
<xml_diff>
--- a/Documentation/Major Project Documents/Group 15 Major Project Review 1 Presentation.pptx
+++ b/Documentation/Major Project Documents/Group 15 Major Project Review 1 Presentation.pptx
@@ -22,12 +22,14 @@
     <p:sldId id="270" r:id="rId16"/>
     <p:sldId id="271" r:id="rId17"/>
     <p:sldId id="272" r:id="rId18"/>
-    <p:sldId id="273" r:id="rId19"/>
-    <p:sldId id="278" r:id="rId20"/>
-    <p:sldId id="274" r:id="rId21"/>
-    <p:sldId id="275" r:id="rId22"/>
-    <p:sldId id="276" r:id="rId23"/>
-    <p:sldId id="277" r:id="rId24"/>
+    <p:sldId id="279" r:id="rId19"/>
+    <p:sldId id="280" r:id="rId20"/>
+    <p:sldId id="273" r:id="rId21"/>
+    <p:sldId id="278" r:id="rId22"/>
+    <p:sldId id="274" r:id="rId23"/>
+    <p:sldId id="275" r:id="rId24"/>
+    <p:sldId id="276" r:id="rId25"/>
+    <p:sldId id="277" r:id="rId26"/>
   </p:sldIdLst>
   <p:sldSz cx="10083800" cy="7562850"/>
   <p:notesSz cx="10083800" cy="7562850"/>
@@ -206,7 +208,7 @@
           <a:p>
             <a:fld id="{1D8BD707-D9CF-40AE-B4C6-C98DA3205C09}" type="datetimeFigureOut">
               <a:rPr lang="en-US"/>
-              <a:t>10/10/2024</a:t>
+              <a:t>10/23/2024</a:t>
             </a:fld>
             <a:endParaRPr lang="en-US"/>
           </a:p>
@@ -383,7 +385,7 @@
           <a:p>
             <a:fld id="{1D8BD707-D9CF-40AE-B4C6-C98DA3205C09}" type="datetimeFigureOut">
               <a:rPr lang="en-US"/>
-              <a:t>10/10/2024</a:t>
+              <a:t>10/23/2024</a:t>
             </a:fld>
             <a:endParaRPr lang="en-US"/>
           </a:p>
@@ -597,7 +599,7 @@
           <a:p>
             <a:fld id="{1D8BD707-D9CF-40AE-B4C6-C98DA3205C09}" type="datetimeFigureOut">
               <a:rPr lang="en-US"/>
-              <a:t>10/10/2024</a:t>
+              <a:t>10/23/2024</a:t>
             </a:fld>
             <a:endParaRPr lang="en-US"/>
           </a:p>
@@ -745,7 +747,7 @@
           <a:p>
             <a:fld id="{1D8BD707-D9CF-40AE-B4C6-C98DA3205C09}" type="datetimeFigureOut">
               <a:rPr lang="en-US"/>
-              <a:t>10/10/2024</a:t>
+              <a:t>10/23/2024</a:t>
             </a:fld>
             <a:endParaRPr lang="en-US"/>
           </a:p>
@@ -864,7 +866,7 @@
           <a:p>
             <a:fld id="{1D8BD707-D9CF-40AE-B4C6-C98DA3205C09}" type="datetimeFigureOut">
               <a:rPr lang="en-US"/>
-              <a:t>10/10/2024</a:t>
+              <a:t>10/23/2024</a:t>
             </a:fld>
             <a:endParaRPr lang="en-US"/>
           </a:p>
@@ -1580,7 +1582,7 @@
           <a:p>
             <a:fld id="{1D8BD707-D9CF-40AE-B4C6-C98DA3205C09}" type="datetimeFigureOut">
               <a:rPr lang="en-US"/>
-              <a:t>10/10/2024</a:t>
+              <a:t>10/23/2024</a:t>
             </a:fld>
             <a:endParaRPr lang="en-US"/>
           </a:p>
@@ -3237,7 +3239,7 @@
         <p:spPr>
           <a:xfrm>
             <a:off x="438708" y="1933448"/>
-            <a:ext cx="8629650" cy="4248150"/>
+            <a:ext cx="8629650" cy="3572773"/>
           </a:xfrm>
           <a:prstGeom prst="rect">
             <a:avLst/>
@@ -3556,7 +3558,7 @@
               </a:rPr>
               <a:t>workouts.</a:t>
             </a:r>
-            <a:endParaRPr sz="1800">
+            <a:endParaRPr sz="1800" dirty="0">
               <a:latin typeface="Times New Roman"/>
               <a:cs typeface="Times New Roman"/>
             </a:endParaRPr>
@@ -3708,7 +3710,7 @@
               </a:rPr>
               <a:t>like</a:t>
             </a:r>
-            <a:endParaRPr sz="1800">
+            <a:endParaRPr sz="1800" dirty="0">
               <a:latin typeface="Times New Roman"/>
               <a:cs typeface="Times New Roman"/>
             </a:endParaRPr>
@@ -3838,7 +3840,7 @@
               </a:rPr>
               <a:t>conditions.</a:t>
             </a:r>
-            <a:endParaRPr sz="1800">
+            <a:endParaRPr sz="1800" dirty="0">
               <a:latin typeface="Times New Roman"/>
               <a:cs typeface="Times New Roman"/>
             </a:endParaRPr>
@@ -4137,317 +4139,7 @@
               </a:rPr>
               <a:t>challenge.</a:t>
             </a:r>
-            <a:endParaRPr sz="1800">
-              <a:latin typeface="Times New Roman"/>
-              <a:cs typeface="Times New Roman"/>
-            </a:endParaRPr>
-          </a:p>
-          <a:p>
-            <a:pPr marL="354965" indent="-342265" algn="just">
-              <a:lnSpc>
-                <a:spcPct val="100000"/>
-              </a:lnSpc>
-              <a:spcBef>
-                <a:spcPts val="1030"/>
-              </a:spcBef>
-              <a:buFont typeface="Arial MT"/>
-              <a:buChar char="•"/>
-              <a:tabLst>
-                <a:tab pos="354965" algn="l"/>
-              </a:tabLst>
-            </a:pPr>
-            <a:r>
-              <a:rPr sz="1800" dirty="0">
-                <a:latin typeface="Times New Roman"/>
-                <a:cs typeface="Times New Roman"/>
-              </a:rPr>
-              <a:t>High</a:t>
-            </a:r>
-            <a:r>
-              <a:rPr sz="1800" spc="370" dirty="0">
-                <a:latin typeface="Times New Roman"/>
-                <a:cs typeface="Times New Roman"/>
-              </a:rPr>
-              <a:t> </a:t>
-            </a:r>
-            <a:r>
-              <a:rPr sz="1800" dirty="0">
-                <a:latin typeface="Times New Roman"/>
-                <a:cs typeface="Times New Roman"/>
-              </a:rPr>
-              <a:t>Computational</a:t>
-            </a:r>
-            <a:r>
-              <a:rPr sz="1800" spc="375" dirty="0">
-                <a:latin typeface="Times New Roman"/>
-                <a:cs typeface="Times New Roman"/>
-              </a:rPr>
-              <a:t> </a:t>
-            </a:r>
-            <a:r>
-              <a:rPr sz="1800" dirty="0">
-                <a:latin typeface="Times New Roman"/>
-                <a:cs typeface="Times New Roman"/>
-              </a:rPr>
-              <a:t>Demand:</a:t>
-            </a:r>
-            <a:r>
-              <a:rPr sz="1800" spc="360" dirty="0">
-                <a:latin typeface="Times New Roman"/>
-                <a:cs typeface="Times New Roman"/>
-              </a:rPr>
-              <a:t> </a:t>
-            </a:r>
-            <a:r>
-              <a:rPr sz="1800" dirty="0">
-                <a:latin typeface="Times New Roman"/>
-                <a:cs typeface="Times New Roman"/>
-              </a:rPr>
-              <a:t>Deep</a:t>
-            </a:r>
-            <a:r>
-              <a:rPr sz="1800" spc="365" dirty="0">
-                <a:latin typeface="Times New Roman"/>
-                <a:cs typeface="Times New Roman"/>
-              </a:rPr>
-              <a:t> </a:t>
-            </a:r>
-            <a:r>
-              <a:rPr sz="1800" dirty="0">
-                <a:latin typeface="Times New Roman"/>
-                <a:cs typeface="Times New Roman"/>
-              </a:rPr>
-              <a:t>learning</a:t>
-            </a:r>
-            <a:r>
-              <a:rPr sz="1800" spc="355" dirty="0">
-                <a:latin typeface="Times New Roman"/>
-                <a:cs typeface="Times New Roman"/>
-              </a:rPr>
-              <a:t> </a:t>
-            </a:r>
-            <a:r>
-              <a:rPr sz="1800" dirty="0">
-                <a:latin typeface="Times New Roman"/>
-                <a:cs typeface="Times New Roman"/>
-              </a:rPr>
-              <a:t>models,</a:t>
-            </a:r>
-            <a:r>
-              <a:rPr sz="1800" spc="380" dirty="0">
-                <a:latin typeface="Times New Roman"/>
-                <a:cs typeface="Times New Roman"/>
-              </a:rPr>
-              <a:t> </a:t>
-            </a:r>
-            <a:r>
-              <a:rPr sz="1800" dirty="0">
-                <a:latin typeface="Times New Roman"/>
-                <a:cs typeface="Times New Roman"/>
-              </a:rPr>
-              <a:t>such</a:t>
-            </a:r>
-            <a:r>
-              <a:rPr sz="1800" spc="365" dirty="0">
-                <a:latin typeface="Times New Roman"/>
-                <a:cs typeface="Times New Roman"/>
-              </a:rPr>
-              <a:t> </a:t>
-            </a:r>
-            <a:r>
-              <a:rPr sz="1800" dirty="0">
-                <a:latin typeface="Times New Roman"/>
-                <a:cs typeface="Times New Roman"/>
-              </a:rPr>
-              <a:t>as</a:t>
-            </a:r>
-            <a:r>
-              <a:rPr sz="1800" spc="355" dirty="0">
-                <a:latin typeface="Times New Roman"/>
-                <a:cs typeface="Times New Roman"/>
-              </a:rPr>
-              <a:t> </a:t>
-            </a:r>
-            <a:r>
-              <a:rPr sz="1800" dirty="0">
-                <a:latin typeface="Times New Roman"/>
-                <a:cs typeface="Times New Roman"/>
-              </a:rPr>
-              <a:t>MLP,</a:t>
-            </a:r>
-            <a:r>
-              <a:rPr sz="1800" spc="365" dirty="0">
-                <a:latin typeface="Times New Roman"/>
-                <a:cs typeface="Times New Roman"/>
-              </a:rPr>
-              <a:t> </a:t>
-            </a:r>
-            <a:r>
-              <a:rPr sz="1800" dirty="0">
-                <a:latin typeface="Times New Roman"/>
-                <a:cs typeface="Times New Roman"/>
-              </a:rPr>
-              <a:t>face</a:t>
-            </a:r>
-            <a:r>
-              <a:rPr sz="1800" spc="365" dirty="0">
-                <a:latin typeface="Times New Roman"/>
-                <a:cs typeface="Times New Roman"/>
-              </a:rPr>
-              <a:t> </a:t>
-            </a:r>
-            <a:r>
-              <a:rPr sz="1800" dirty="0">
-                <a:latin typeface="Times New Roman"/>
-                <a:cs typeface="Times New Roman"/>
-              </a:rPr>
-              <a:t>issues</a:t>
-            </a:r>
-            <a:r>
-              <a:rPr sz="1800" spc="370" dirty="0">
-                <a:latin typeface="Times New Roman"/>
-                <a:cs typeface="Times New Roman"/>
-              </a:rPr>
-              <a:t> </a:t>
-            </a:r>
-            <a:r>
-              <a:rPr sz="1800" spc="-20" dirty="0">
-                <a:latin typeface="Times New Roman"/>
-                <a:cs typeface="Times New Roman"/>
-              </a:rPr>
-              <a:t>with</a:t>
-            </a:r>
-            <a:endParaRPr sz="1800">
-              <a:latin typeface="Times New Roman"/>
-              <a:cs typeface="Times New Roman"/>
-            </a:endParaRPr>
-          </a:p>
-          <a:p>
-            <a:pPr marL="355600" algn="just">
-              <a:lnSpc>
-                <a:spcPct val="100000"/>
-              </a:lnSpc>
-            </a:pPr>
-            <a:r>
-              <a:rPr sz="1800" dirty="0">
-                <a:latin typeface="Times New Roman"/>
-                <a:cs typeface="Times New Roman"/>
-              </a:rPr>
-              <a:t>scalability</a:t>
-            </a:r>
-            <a:r>
-              <a:rPr sz="1800" spc="-30" dirty="0">
-                <a:latin typeface="Times New Roman"/>
-                <a:cs typeface="Times New Roman"/>
-              </a:rPr>
-              <a:t> </a:t>
-            </a:r>
-            <a:r>
-              <a:rPr sz="1800" dirty="0">
-                <a:latin typeface="Times New Roman"/>
-                <a:cs typeface="Times New Roman"/>
-              </a:rPr>
-              <a:t>and</a:t>
-            </a:r>
-            <a:r>
-              <a:rPr sz="1800" spc="-5" dirty="0">
-                <a:latin typeface="Times New Roman"/>
-                <a:cs typeface="Times New Roman"/>
-              </a:rPr>
-              <a:t> </a:t>
-            </a:r>
-            <a:r>
-              <a:rPr sz="1800" dirty="0">
-                <a:latin typeface="Times New Roman"/>
-                <a:cs typeface="Times New Roman"/>
-              </a:rPr>
-              <a:t>real-time</a:t>
-            </a:r>
-            <a:r>
-              <a:rPr sz="1800" spc="-10" dirty="0">
-                <a:latin typeface="Times New Roman"/>
-                <a:cs typeface="Times New Roman"/>
-              </a:rPr>
-              <a:t> </a:t>
-            </a:r>
-            <a:r>
-              <a:rPr sz="1800" dirty="0">
-                <a:latin typeface="Times New Roman"/>
-                <a:cs typeface="Times New Roman"/>
-              </a:rPr>
-              <a:t>application</a:t>
-            </a:r>
-            <a:r>
-              <a:rPr sz="1800" spc="-25" dirty="0">
-                <a:latin typeface="Times New Roman"/>
-                <a:cs typeface="Times New Roman"/>
-              </a:rPr>
-              <a:t> </a:t>
-            </a:r>
-            <a:r>
-              <a:rPr sz="1800" dirty="0">
-                <a:latin typeface="Times New Roman"/>
-                <a:cs typeface="Times New Roman"/>
-              </a:rPr>
-              <a:t>due</a:t>
-            </a:r>
-            <a:r>
-              <a:rPr sz="1800" spc="-10" dirty="0">
-                <a:latin typeface="Times New Roman"/>
-                <a:cs typeface="Times New Roman"/>
-              </a:rPr>
-              <a:t> </a:t>
-            </a:r>
-            <a:r>
-              <a:rPr sz="1800" dirty="0">
-                <a:latin typeface="Times New Roman"/>
-                <a:cs typeface="Times New Roman"/>
-              </a:rPr>
-              <a:t>to</a:t>
-            </a:r>
-            <a:r>
-              <a:rPr sz="1800" spc="-10" dirty="0">
-                <a:latin typeface="Times New Roman"/>
-                <a:cs typeface="Times New Roman"/>
-              </a:rPr>
-              <a:t> </a:t>
-            </a:r>
-            <a:r>
-              <a:rPr sz="1800" dirty="0">
-                <a:latin typeface="Times New Roman"/>
-                <a:cs typeface="Times New Roman"/>
-              </a:rPr>
-              <a:t>high</a:t>
-            </a:r>
-            <a:r>
-              <a:rPr sz="1800" spc="-15" dirty="0">
-                <a:latin typeface="Times New Roman"/>
-                <a:cs typeface="Times New Roman"/>
-              </a:rPr>
-              <a:t> </a:t>
-            </a:r>
-            <a:r>
-              <a:rPr sz="1800" dirty="0">
-                <a:latin typeface="Times New Roman"/>
-                <a:cs typeface="Times New Roman"/>
-              </a:rPr>
-              <a:t>computational</a:t>
-            </a:r>
-            <a:r>
-              <a:rPr sz="1800" spc="-5" dirty="0">
-                <a:latin typeface="Times New Roman"/>
-                <a:cs typeface="Times New Roman"/>
-              </a:rPr>
-              <a:t> </a:t>
-            </a:r>
-            <a:r>
-              <a:rPr sz="1800" spc="-10" dirty="0">
-                <a:latin typeface="Times New Roman"/>
-                <a:cs typeface="Times New Roman"/>
-              </a:rPr>
-              <a:t>requirements.</a:t>
-            </a:r>
-            <a:endParaRPr sz="1800">
+            <a:endParaRPr sz="1800" dirty="0">
               <a:latin typeface="Times New Roman"/>
               <a:cs typeface="Times New Roman"/>
             </a:endParaRPr>
@@ -4467,223 +4159,223 @@
               </a:tabLst>
             </a:pPr>
             <a:r>
-              <a:rPr sz="1800" dirty="0">
+              <a:rPr lang="en-US" sz="1800" dirty="0">
                 <a:latin typeface="Times New Roman"/>
                 <a:cs typeface="Times New Roman"/>
               </a:rPr>
               <a:t>Limited</a:t>
             </a:r>
             <a:r>
-              <a:rPr sz="1800" spc="40" dirty="0">
-                <a:latin typeface="Times New Roman"/>
-                <a:cs typeface="Times New Roman"/>
-              </a:rPr>
-              <a:t> </a:t>
-            </a:r>
-            <a:r>
-              <a:rPr sz="1800" dirty="0">
+              <a:rPr lang="en-US" sz="1800" spc="40" dirty="0">
+                <a:latin typeface="Times New Roman"/>
+                <a:cs typeface="Times New Roman"/>
+              </a:rPr>
+              <a:t> </a:t>
+            </a:r>
+            <a:r>
+              <a:rPr lang="en-US" sz="1800" dirty="0">
                 <a:latin typeface="Times New Roman"/>
                 <a:cs typeface="Times New Roman"/>
               </a:rPr>
               <a:t>Personalization:</a:t>
             </a:r>
             <a:r>
-              <a:rPr sz="1800" spc="35" dirty="0">
-                <a:latin typeface="Times New Roman"/>
-                <a:cs typeface="Times New Roman"/>
-              </a:rPr>
-              <a:t> </a:t>
-            </a:r>
-            <a:r>
-              <a:rPr sz="1800" dirty="0">
+              <a:rPr lang="en-US" sz="1800" spc="35" dirty="0">
+                <a:latin typeface="Times New Roman"/>
+                <a:cs typeface="Times New Roman"/>
+              </a:rPr>
+              <a:t> </a:t>
+            </a:r>
+            <a:r>
+              <a:rPr lang="en-US" sz="1800" dirty="0">
                 <a:latin typeface="Times New Roman"/>
                 <a:cs typeface="Times New Roman"/>
               </a:rPr>
               <a:t>Many</a:t>
             </a:r>
             <a:r>
-              <a:rPr sz="1800" spc="45" dirty="0">
-                <a:latin typeface="Times New Roman"/>
-                <a:cs typeface="Times New Roman"/>
-              </a:rPr>
-              <a:t> </a:t>
-            </a:r>
-            <a:r>
-              <a:rPr sz="1800" dirty="0">
+              <a:rPr lang="en-US" sz="1800" spc="45" dirty="0">
+                <a:latin typeface="Times New Roman"/>
+                <a:cs typeface="Times New Roman"/>
+              </a:rPr>
+              <a:t> </a:t>
+            </a:r>
+            <a:r>
+              <a:rPr lang="en-US" sz="1800" dirty="0">
                 <a:latin typeface="Times New Roman"/>
                 <a:cs typeface="Times New Roman"/>
               </a:rPr>
               <a:t>systems</a:t>
             </a:r>
             <a:r>
-              <a:rPr sz="1800" spc="30" dirty="0">
-                <a:latin typeface="Times New Roman"/>
-                <a:cs typeface="Times New Roman"/>
-              </a:rPr>
-              <a:t> </a:t>
-            </a:r>
-            <a:r>
-              <a:rPr sz="1800" dirty="0">
+              <a:rPr lang="en-US" sz="1800" spc="30" dirty="0">
+                <a:latin typeface="Times New Roman"/>
+                <a:cs typeface="Times New Roman"/>
+              </a:rPr>
+              <a:t> </a:t>
+            </a:r>
+            <a:r>
+              <a:rPr lang="en-US" sz="1800" dirty="0">
                 <a:latin typeface="Times New Roman"/>
                 <a:cs typeface="Times New Roman"/>
               </a:rPr>
               <a:t>lack</a:t>
             </a:r>
             <a:r>
-              <a:rPr sz="1800" spc="35" dirty="0">
-                <a:latin typeface="Times New Roman"/>
-                <a:cs typeface="Times New Roman"/>
-              </a:rPr>
-              <a:t> </a:t>
-            </a:r>
-            <a:r>
-              <a:rPr sz="1800" dirty="0">
+              <a:rPr lang="en-US" sz="1800" spc="35" dirty="0">
+                <a:latin typeface="Times New Roman"/>
+                <a:cs typeface="Times New Roman"/>
+              </a:rPr>
+              <a:t> </a:t>
+            </a:r>
+            <a:r>
+              <a:rPr lang="en-US" sz="1800" dirty="0">
                 <a:latin typeface="Times New Roman"/>
                 <a:cs typeface="Times New Roman"/>
               </a:rPr>
               <a:t>dynamic,</a:t>
             </a:r>
             <a:r>
-              <a:rPr sz="1800" spc="45" dirty="0">
-                <a:latin typeface="Times New Roman"/>
-                <a:cs typeface="Times New Roman"/>
-              </a:rPr>
-              <a:t> </a:t>
-            </a:r>
-            <a:r>
-              <a:rPr sz="1800" spc="-10" dirty="0">
+              <a:rPr lang="en-US" sz="1800" spc="45" dirty="0">
+                <a:latin typeface="Times New Roman"/>
+                <a:cs typeface="Times New Roman"/>
+              </a:rPr>
+              <a:t> </a:t>
+            </a:r>
+            <a:r>
+              <a:rPr lang="en-US" sz="1800" spc="-10" dirty="0">
                 <a:latin typeface="Times New Roman"/>
                 <a:cs typeface="Times New Roman"/>
               </a:rPr>
               <a:t>real-</a:t>
             </a:r>
             <a:r>
-              <a:rPr sz="1800" dirty="0">
+              <a:rPr lang="en-US" sz="1800" dirty="0">
                 <a:latin typeface="Times New Roman"/>
                 <a:cs typeface="Times New Roman"/>
               </a:rPr>
               <a:t>time</a:t>
             </a:r>
             <a:r>
-              <a:rPr sz="1800" spc="30" dirty="0">
-                <a:latin typeface="Times New Roman"/>
-                <a:cs typeface="Times New Roman"/>
-              </a:rPr>
-              <a:t> </a:t>
-            </a:r>
-            <a:r>
-              <a:rPr sz="1800" dirty="0">
+              <a:rPr lang="en-US" sz="1800" spc="30" dirty="0">
+                <a:latin typeface="Times New Roman"/>
+                <a:cs typeface="Times New Roman"/>
+              </a:rPr>
+              <a:t> </a:t>
+            </a:r>
+            <a:r>
+              <a:rPr lang="en-US" sz="1800" dirty="0">
                 <a:latin typeface="Times New Roman"/>
                 <a:cs typeface="Times New Roman"/>
               </a:rPr>
               <a:t>personalization</a:t>
             </a:r>
             <a:r>
-              <a:rPr sz="1800" spc="35" dirty="0">
-                <a:latin typeface="Times New Roman"/>
-                <a:cs typeface="Times New Roman"/>
-              </a:rPr>
-              <a:t> </a:t>
-            </a:r>
-            <a:r>
-              <a:rPr sz="1800" dirty="0">
+              <a:rPr lang="en-US" sz="1800" spc="35" dirty="0">
+                <a:latin typeface="Times New Roman"/>
+                <a:cs typeface="Times New Roman"/>
+              </a:rPr>
+              <a:t> </a:t>
+            </a:r>
+            <a:r>
+              <a:rPr lang="en-US" sz="1800" dirty="0">
                 <a:latin typeface="Times New Roman"/>
                 <a:cs typeface="Times New Roman"/>
               </a:rPr>
               <a:t>based</a:t>
             </a:r>
             <a:r>
-              <a:rPr sz="1800" spc="40" dirty="0">
-                <a:latin typeface="Times New Roman"/>
-                <a:cs typeface="Times New Roman"/>
-              </a:rPr>
-              <a:t> </a:t>
-            </a:r>
-            <a:r>
-              <a:rPr sz="1800" spc="-25" dirty="0">
+              <a:rPr lang="en-US" sz="1800" spc="40" dirty="0">
+                <a:latin typeface="Times New Roman"/>
+                <a:cs typeface="Times New Roman"/>
+              </a:rPr>
+              <a:t> </a:t>
+            </a:r>
+            <a:r>
+              <a:rPr lang="en-US" sz="1800" spc="-25" dirty="0">
                 <a:latin typeface="Times New Roman"/>
                 <a:cs typeface="Times New Roman"/>
               </a:rPr>
               <a:t>on </a:t>
             </a:r>
             <a:r>
-              <a:rPr sz="1800" dirty="0">
+              <a:rPr lang="en-US" sz="1800" dirty="0">
                 <a:latin typeface="Times New Roman"/>
                 <a:cs typeface="Times New Roman"/>
               </a:rPr>
               <a:t>user</a:t>
             </a:r>
             <a:r>
-              <a:rPr sz="1800" spc="-50" dirty="0">
-                <a:latin typeface="Times New Roman"/>
-                <a:cs typeface="Times New Roman"/>
-              </a:rPr>
-              <a:t> </a:t>
-            </a:r>
-            <a:r>
-              <a:rPr sz="1800" dirty="0">
+              <a:rPr lang="en-US" sz="1800" spc="-50" dirty="0">
+                <a:latin typeface="Times New Roman"/>
+                <a:cs typeface="Times New Roman"/>
+              </a:rPr>
+              <a:t> </a:t>
+            </a:r>
+            <a:r>
+              <a:rPr lang="en-US" sz="1800" dirty="0">
                 <a:latin typeface="Times New Roman"/>
                 <a:cs typeface="Times New Roman"/>
               </a:rPr>
               <a:t>preferences</a:t>
             </a:r>
             <a:r>
-              <a:rPr sz="1800" spc="-40" dirty="0">
-                <a:latin typeface="Times New Roman"/>
-                <a:cs typeface="Times New Roman"/>
-              </a:rPr>
-              <a:t> </a:t>
-            </a:r>
-            <a:r>
-              <a:rPr sz="1800" dirty="0">
+              <a:rPr lang="en-US" sz="1800" spc="-40" dirty="0">
+                <a:latin typeface="Times New Roman"/>
+                <a:cs typeface="Times New Roman"/>
+              </a:rPr>
+              <a:t> </a:t>
+            </a:r>
+            <a:r>
+              <a:rPr lang="en-US" sz="1800" dirty="0">
                 <a:latin typeface="Times New Roman"/>
                 <a:cs typeface="Times New Roman"/>
               </a:rPr>
               <a:t>and</a:t>
             </a:r>
             <a:r>
-              <a:rPr sz="1800" spc="-45" dirty="0">
-                <a:latin typeface="Times New Roman"/>
-                <a:cs typeface="Times New Roman"/>
-              </a:rPr>
-              <a:t> </a:t>
-            </a:r>
-            <a:r>
-              <a:rPr sz="1800" dirty="0">
+              <a:rPr lang="en-US" sz="1800" spc="-45" dirty="0">
+                <a:latin typeface="Times New Roman"/>
+                <a:cs typeface="Times New Roman"/>
+              </a:rPr>
+              <a:t> </a:t>
+            </a:r>
+            <a:r>
+              <a:rPr lang="en-US" sz="1800" dirty="0">
                 <a:latin typeface="Times New Roman"/>
                 <a:cs typeface="Times New Roman"/>
               </a:rPr>
               <a:t>evolving</a:t>
             </a:r>
             <a:r>
-              <a:rPr sz="1800" spc="-55" dirty="0">
-                <a:latin typeface="Times New Roman"/>
-                <a:cs typeface="Times New Roman"/>
-              </a:rPr>
-              <a:t> </a:t>
-            </a:r>
-            <a:r>
-              <a:rPr sz="1800" dirty="0">
+              <a:rPr lang="en-US" sz="1800" spc="-55" dirty="0">
+                <a:latin typeface="Times New Roman"/>
+                <a:cs typeface="Times New Roman"/>
+              </a:rPr>
+              <a:t> </a:t>
+            </a:r>
+            <a:r>
+              <a:rPr lang="en-US" sz="1800" dirty="0">
                 <a:latin typeface="Times New Roman"/>
                 <a:cs typeface="Times New Roman"/>
               </a:rPr>
               <a:t>fitness</a:t>
             </a:r>
             <a:r>
-              <a:rPr sz="1800" spc="-40" dirty="0">
-                <a:latin typeface="Times New Roman"/>
-                <a:cs typeface="Times New Roman"/>
-              </a:rPr>
-              <a:t> </a:t>
-            </a:r>
-            <a:r>
-              <a:rPr sz="1800" spc="-10" dirty="0">
+              <a:rPr lang="en-US" sz="1800" spc="-40" dirty="0">
+                <a:latin typeface="Times New Roman"/>
+                <a:cs typeface="Times New Roman"/>
+              </a:rPr>
+              <a:t> </a:t>
+            </a:r>
+            <a:r>
+              <a:rPr lang="en-US" sz="1800" spc="-10" dirty="0">
                 <a:latin typeface="Times New Roman"/>
                 <a:cs typeface="Times New Roman"/>
               </a:rPr>
               <a:t>levels.</a:t>
             </a:r>
-            <a:endParaRPr sz="1800">
+            <a:endParaRPr lang="en-US" sz="1800" dirty="0">
               <a:latin typeface="Times New Roman"/>
               <a:cs typeface="Times New Roman"/>
             </a:endParaRPr>
@@ -5164,7 +4856,7 @@
               </a:rPr>
               <a:t>solution.</a:t>
             </a:r>
-            <a:endParaRPr sz="1800">
+            <a:endParaRPr sz="1800" dirty="0">
               <a:latin typeface="Times New Roman"/>
               <a:cs typeface="Times New Roman"/>
             </a:endParaRPr>
@@ -14807,6 +14499,125 @@
           </a:p>
         </p:txBody>
       </p:sp>
+      <p:pic>
+        <p:nvPicPr>
+          <p:cNvPr id="5" name="Picture 4">
+            <a:extLst>
+              <a:ext uri="{FF2B5EF4-FFF2-40B4-BE49-F238E27FC236}">
+                <a16:creationId xmlns:a16="http://schemas.microsoft.com/office/drawing/2014/main" id="{E5210534-E578-7978-50D3-22E7A0C0E154}"/>
+              </a:ext>
+            </a:extLst>
+          </p:cNvPr>
+          <p:cNvPicPr>
+            <a:picLocks noChangeAspect="1"/>
+          </p:cNvPicPr>
+          <p:nvPr/>
+        </p:nvPicPr>
+        <p:blipFill>
+          <a:blip r:embed="rId3"/>
+          <a:stretch>
+            <a:fillRect/>
+          </a:stretch>
+        </p:blipFill>
+        <p:spPr>
+          <a:xfrm>
+            <a:off x="389165" y="1874784"/>
+            <a:ext cx="3009262" cy="4748125"/>
+          </a:xfrm>
+          <a:prstGeom prst="rect">
+            <a:avLst/>
+          </a:prstGeom>
+        </p:spPr>
+      </p:pic>
+      <p:pic>
+        <p:nvPicPr>
+          <p:cNvPr id="7" name="Picture 6">
+            <a:extLst>
+              <a:ext uri="{FF2B5EF4-FFF2-40B4-BE49-F238E27FC236}">
+                <a16:creationId xmlns:a16="http://schemas.microsoft.com/office/drawing/2014/main" id="{3E0F6980-46E5-6AEE-FDCF-5A6D95E2FD42}"/>
+              </a:ext>
+            </a:extLst>
+          </p:cNvPr>
+          <p:cNvPicPr>
+            <a:picLocks noChangeAspect="1"/>
+          </p:cNvPicPr>
+          <p:nvPr/>
+        </p:nvPicPr>
+        <p:blipFill>
+          <a:blip r:embed="rId4"/>
+          <a:stretch>
+            <a:fillRect/>
+          </a:stretch>
+        </p:blipFill>
+        <p:spPr>
+          <a:xfrm>
+            <a:off x="3441700" y="1876425"/>
+            <a:ext cx="2895600" cy="2284609"/>
+          </a:xfrm>
+          <a:prstGeom prst="rect">
+            <a:avLst/>
+          </a:prstGeom>
+        </p:spPr>
+      </p:pic>
+      <p:pic>
+        <p:nvPicPr>
+          <p:cNvPr id="9" name="Picture 8">
+            <a:extLst>
+              <a:ext uri="{FF2B5EF4-FFF2-40B4-BE49-F238E27FC236}">
+                <a16:creationId xmlns:a16="http://schemas.microsoft.com/office/drawing/2014/main" id="{0BEB7D55-C4EC-A5E4-5568-863AFC7A7636}"/>
+              </a:ext>
+            </a:extLst>
+          </p:cNvPr>
+          <p:cNvPicPr>
+            <a:picLocks noChangeAspect="1"/>
+          </p:cNvPicPr>
+          <p:nvPr/>
+        </p:nvPicPr>
+        <p:blipFill>
+          <a:blip r:embed="rId5"/>
+          <a:stretch>
+            <a:fillRect/>
+          </a:stretch>
+        </p:blipFill>
+        <p:spPr>
+          <a:xfrm>
+            <a:off x="3442159" y="4314825"/>
+            <a:ext cx="2895141" cy="2308084"/>
+          </a:xfrm>
+          <a:prstGeom prst="rect">
+            <a:avLst/>
+          </a:prstGeom>
+        </p:spPr>
+      </p:pic>
+      <p:pic>
+        <p:nvPicPr>
+          <p:cNvPr id="11" name="Picture 10">
+            <a:extLst>
+              <a:ext uri="{FF2B5EF4-FFF2-40B4-BE49-F238E27FC236}">
+                <a16:creationId xmlns:a16="http://schemas.microsoft.com/office/drawing/2014/main" id="{87FBEBEC-7698-1F4D-7371-86F0ECE0B673}"/>
+              </a:ext>
+            </a:extLst>
+          </p:cNvPr>
+          <p:cNvPicPr>
+            <a:picLocks noChangeAspect="1"/>
+          </p:cNvPicPr>
+          <p:nvPr/>
+        </p:nvPicPr>
+        <p:blipFill>
+          <a:blip r:embed="rId6"/>
+          <a:srcRect t="9633"/>
+          <a:stretch/>
+        </p:blipFill>
+        <p:spPr>
+          <a:xfrm>
+            <a:off x="6550148" y="2016392"/>
+            <a:ext cx="3120371" cy="4289284"/>
+          </a:xfrm>
+          <a:prstGeom prst="rect">
+            <a:avLst/>
+          </a:prstGeom>
+        </p:spPr>
+      </p:pic>
     </p:spTree>
   </p:cSld>
   <p:clrMapOvr>
@@ -14816,6 +14627,825 @@
 </file>
 
 <file path=ppt/slides/slide18.xml><?xml version="1.0" encoding="utf-8"?>
+<p:sld xmlns:a="http://schemas.openxmlformats.org/drawingml/2006/main" xmlns:r="http://schemas.openxmlformats.org/officeDocument/2006/relationships" xmlns:p="http://schemas.openxmlformats.org/presentationml/2006/main">
+  <p:cSld>
+    <p:spTree>
+      <p:nvGrpSpPr>
+        <p:cNvPr id="1" name=""/>
+        <p:cNvGrpSpPr/>
+        <p:nvPr/>
+      </p:nvGrpSpPr>
+      <p:grpSpPr>
+        <a:xfrm>
+          <a:off x="0" y="0"/>
+          <a:ext cx="0" cy="0"/>
+          <a:chOff x="0" y="0"/>
+          <a:chExt cx="0" cy="0"/>
+        </a:xfrm>
+      </p:grpSpPr>
+      <p:pic>
+        <p:nvPicPr>
+          <p:cNvPr id="2" name="object 2"/>
+          <p:cNvPicPr/>
+          <p:nvPr/>
+        </p:nvPicPr>
+        <p:blipFill>
+          <a:blip r:embed="rId2" cstate="print"/>
+          <a:stretch>
+            <a:fillRect/>
+          </a:stretch>
+        </p:blipFill>
+        <p:spPr>
+          <a:xfrm>
+            <a:off x="770984" y="848657"/>
+            <a:ext cx="6401883" cy="443149"/>
+          </a:xfrm>
+          <a:prstGeom prst="rect">
+            <a:avLst/>
+          </a:prstGeom>
+        </p:spPr>
+      </p:pic>
+      <p:sp>
+        <p:nvSpPr>
+          <p:cNvPr id="3" name="object 3"/>
+          <p:cNvSpPr txBox="1">
+            <a:spLocks noGrp="1"/>
+          </p:cNvSpPr>
+          <p:nvPr>
+            <p:ph type="ctrTitle"/>
+          </p:nvPr>
+        </p:nvSpPr>
+        <p:spPr>
+          <a:prstGeom prst="rect">
+            <a:avLst/>
+          </a:prstGeom>
+        </p:spPr>
+        <p:txBody>
+          <a:bodyPr vert="horz" wrap="square" lIns="0" tIns="74676" rIns="0" bIns="0" rtlCol="0">
+            <a:spAutoFit/>
+          </a:bodyPr>
+          <a:lstStyle/>
+          <a:p>
+            <a:pPr marL="272415">
+              <a:lnSpc>
+                <a:spcPct val="100000"/>
+              </a:lnSpc>
+              <a:spcBef>
+                <a:spcPts val="100"/>
+              </a:spcBef>
+            </a:pPr>
+            <a:r>
+              <a:rPr dirty="0"/>
+              <a:t>Prototype</a:t>
+            </a:r>
+            <a:r>
+              <a:rPr spc="-110" dirty="0"/>
+              <a:t> </a:t>
+            </a:r>
+            <a:r>
+              <a:rPr dirty="0"/>
+              <a:t>Design</a:t>
+            </a:r>
+            <a:r>
+              <a:rPr spc="-110" dirty="0"/>
+              <a:t> </a:t>
+            </a:r>
+            <a:r>
+              <a:rPr spc="-10" dirty="0"/>
+              <a:t>Demonstration</a:t>
+            </a:r>
+          </a:p>
+        </p:txBody>
+      </p:sp>
+      <p:pic>
+        <p:nvPicPr>
+          <p:cNvPr id="6" name="Picture 5">
+            <a:extLst>
+              <a:ext uri="{FF2B5EF4-FFF2-40B4-BE49-F238E27FC236}">
+                <a16:creationId xmlns:a16="http://schemas.microsoft.com/office/drawing/2014/main" id="{38EF3F6F-A65C-7EEF-38A9-1634C50AD89E}"/>
+              </a:ext>
+            </a:extLst>
+          </p:cNvPr>
+          <p:cNvPicPr>
+            <a:picLocks noChangeAspect="1"/>
+          </p:cNvPicPr>
+          <p:nvPr/>
+        </p:nvPicPr>
+        <p:blipFill>
+          <a:blip r:embed="rId3"/>
+          <a:stretch>
+            <a:fillRect/>
+          </a:stretch>
+        </p:blipFill>
+        <p:spPr>
+          <a:xfrm>
+            <a:off x="770985" y="1512829"/>
+            <a:ext cx="7242716" cy="5221908"/>
+          </a:xfrm>
+          <a:prstGeom prst="rect">
+            <a:avLst/>
+          </a:prstGeom>
+        </p:spPr>
+      </p:pic>
+    </p:spTree>
+    <p:extLst>
+      <p:ext uri="{BB962C8B-B14F-4D97-AF65-F5344CB8AC3E}">
+        <p14:creationId xmlns:p14="http://schemas.microsoft.com/office/powerpoint/2010/main" val="4278226180"/>
+      </p:ext>
+    </p:extLst>
+  </p:cSld>
+  <p:clrMapOvr>
+    <a:masterClrMapping/>
+  </p:clrMapOvr>
+</p:sld>
+</file>
+
+<file path=ppt/slides/slide19.xml><?xml version="1.0" encoding="utf-8"?>
+<p:sld xmlns:a="http://schemas.openxmlformats.org/drawingml/2006/main" xmlns:r="http://schemas.openxmlformats.org/officeDocument/2006/relationships" xmlns:p="http://schemas.openxmlformats.org/presentationml/2006/main">
+  <p:cSld>
+    <p:spTree>
+      <p:nvGrpSpPr>
+        <p:cNvPr id="1" name=""/>
+        <p:cNvGrpSpPr/>
+        <p:nvPr/>
+      </p:nvGrpSpPr>
+      <p:grpSpPr>
+        <a:xfrm>
+          <a:off x="0" y="0"/>
+          <a:ext cx="0" cy="0"/>
+          <a:chOff x="0" y="0"/>
+          <a:chExt cx="0" cy="0"/>
+        </a:xfrm>
+      </p:grpSpPr>
+      <p:pic>
+        <p:nvPicPr>
+          <p:cNvPr id="2" name="object 2"/>
+          <p:cNvPicPr/>
+          <p:nvPr/>
+        </p:nvPicPr>
+        <p:blipFill>
+          <a:blip r:embed="rId2" cstate="print"/>
+          <a:stretch>
+            <a:fillRect/>
+          </a:stretch>
+        </p:blipFill>
+        <p:spPr>
+          <a:xfrm>
+            <a:off x="770984" y="848657"/>
+            <a:ext cx="6401883" cy="443149"/>
+          </a:xfrm>
+          <a:prstGeom prst="rect">
+            <a:avLst/>
+          </a:prstGeom>
+        </p:spPr>
+      </p:pic>
+      <p:sp>
+        <p:nvSpPr>
+          <p:cNvPr id="3" name="object 3"/>
+          <p:cNvSpPr txBox="1">
+            <a:spLocks noGrp="1"/>
+          </p:cNvSpPr>
+          <p:nvPr>
+            <p:ph type="ctrTitle"/>
+          </p:nvPr>
+        </p:nvSpPr>
+        <p:spPr>
+          <a:prstGeom prst="rect">
+            <a:avLst/>
+          </a:prstGeom>
+        </p:spPr>
+        <p:txBody>
+          <a:bodyPr vert="horz" wrap="square" lIns="0" tIns="74676" rIns="0" bIns="0" rtlCol="0">
+            <a:spAutoFit/>
+          </a:bodyPr>
+          <a:lstStyle/>
+          <a:p>
+            <a:pPr marL="272415">
+              <a:lnSpc>
+                <a:spcPct val="100000"/>
+              </a:lnSpc>
+              <a:spcBef>
+                <a:spcPts val="100"/>
+              </a:spcBef>
+            </a:pPr>
+            <a:r>
+              <a:rPr dirty="0"/>
+              <a:t>Prototype</a:t>
+            </a:r>
+            <a:r>
+              <a:rPr spc="-110" dirty="0"/>
+              <a:t> </a:t>
+            </a:r>
+            <a:r>
+              <a:rPr dirty="0"/>
+              <a:t>Design</a:t>
+            </a:r>
+            <a:r>
+              <a:rPr spc="-110" dirty="0"/>
+              <a:t> </a:t>
+            </a:r>
+            <a:r>
+              <a:rPr spc="-10" dirty="0"/>
+              <a:t>Demonstration</a:t>
+            </a:r>
+          </a:p>
+        </p:txBody>
+      </p:sp>
+      <p:pic>
+        <p:nvPicPr>
+          <p:cNvPr id="5" name="Picture 4">
+            <a:extLst>
+              <a:ext uri="{FF2B5EF4-FFF2-40B4-BE49-F238E27FC236}">
+                <a16:creationId xmlns:a16="http://schemas.microsoft.com/office/drawing/2014/main" id="{C4FF0514-9ADB-3B6A-E5F9-639EE43B4D07}"/>
+              </a:ext>
+            </a:extLst>
+          </p:cNvPr>
+          <p:cNvPicPr>
+            <a:picLocks noChangeAspect="1"/>
+          </p:cNvPicPr>
+          <p:nvPr/>
+        </p:nvPicPr>
+        <p:blipFill>
+          <a:blip r:embed="rId3"/>
+          <a:stretch>
+            <a:fillRect/>
+          </a:stretch>
+        </p:blipFill>
+        <p:spPr>
+          <a:xfrm>
+            <a:off x="622300" y="1590464"/>
+            <a:ext cx="4209583" cy="5344752"/>
+          </a:xfrm>
+          <a:prstGeom prst="rect">
+            <a:avLst/>
+          </a:prstGeom>
+        </p:spPr>
+      </p:pic>
+    </p:spTree>
+    <p:extLst>
+      <p:ext uri="{BB962C8B-B14F-4D97-AF65-F5344CB8AC3E}">
+        <p14:creationId xmlns:p14="http://schemas.microsoft.com/office/powerpoint/2010/main" val="112451906"/>
+      </p:ext>
+    </p:extLst>
+  </p:cSld>
+  <p:clrMapOvr>
+    <a:masterClrMapping/>
+  </p:clrMapOvr>
+</p:sld>
+</file>
+
+<file path=ppt/slides/slide2.xml><?xml version="1.0" encoding="utf-8"?>
+<p:sld xmlns:a="http://schemas.openxmlformats.org/drawingml/2006/main" xmlns:r="http://schemas.openxmlformats.org/officeDocument/2006/relationships" xmlns:p="http://schemas.openxmlformats.org/presentationml/2006/main">
+  <p:cSld>
+    <p:spTree>
+      <p:nvGrpSpPr>
+        <p:cNvPr id="1" name=""/>
+        <p:cNvGrpSpPr/>
+        <p:nvPr/>
+      </p:nvGrpSpPr>
+      <p:grpSpPr>
+        <a:xfrm>
+          <a:off x="0" y="0"/>
+          <a:ext cx="0" cy="0"/>
+          <a:chOff x="0" y="0"/>
+          <a:chExt cx="0" cy="0"/>
+        </a:xfrm>
+      </p:grpSpPr>
+      <p:sp>
+        <p:nvSpPr>
+          <p:cNvPr id="2" name="object 2"/>
+          <p:cNvSpPr txBox="1">
+            <a:spLocks noGrp="1"/>
+          </p:cNvSpPr>
+          <p:nvPr>
+            <p:ph type="title"/>
+          </p:nvPr>
+        </p:nvSpPr>
+        <p:spPr>
+          <a:xfrm>
+            <a:off x="4150233" y="368046"/>
+            <a:ext cx="1779270" cy="574040"/>
+          </a:xfrm>
+          <a:prstGeom prst="rect">
+            <a:avLst/>
+          </a:prstGeom>
+        </p:spPr>
+        <p:txBody>
+          <a:bodyPr vert="horz" wrap="square" lIns="0" tIns="12700" rIns="0" bIns="0" rtlCol="0">
+            <a:spAutoFit/>
+          </a:bodyPr>
+          <a:lstStyle/>
+          <a:p>
+            <a:pPr marL="12700">
+              <a:lnSpc>
+                <a:spcPct val="100000"/>
+              </a:lnSpc>
+              <a:spcBef>
+                <a:spcPts val="100"/>
+              </a:spcBef>
+            </a:pPr>
+            <a:r>
+              <a:rPr spc="-10" dirty="0"/>
+              <a:t>Contents</a:t>
+            </a:r>
+          </a:p>
+        </p:txBody>
+      </p:sp>
+      <p:sp>
+        <p:nvSpPr>
+          <p:cNvPr id="3" name="object 3"/>
+          <p:cNvSpPr txBox="1"/>
+          <p:nvPr/>
+        </p:nvSpPr>
+        <p:spPr>
+          <a:xfrm>
+            <a:off x="597204" y="1020683"/>
+            <a:ext cx="5179695" cy="6243955"/>
+          </a:xfrm>
+          <a:prstGeom prst="rect">
+            <a:avLst/>
+          </a:prstGeom>
+        </p:spPr>
+        <p:txBody>
+          <a:bodyPr vert="horz" wrap="square" lIns="0" tIns="165735" rIns="0" bIns="0" rtlCol="0">
+            <a:spAutoFit/>
+          </a:bodyPr>
+          <a:lstStyle/>
+          <a:p>
+            <a:pPr marL="334010" indent="-321310">
+              <a:lnSpc>
+                <a:spcPct val="100000"/>
+              </a:lnSpc>
+              <a:spcBef>
+                <a:spcPts val="1305"/>
+              </a:spcBef>
+              <a:buSzPct val="43750"/>
+              <a:buFont typeface="Wingdings"/>
+              <a:buChar char=""/>
+              <a:tabLst>
+                <a:tab pos="334010" algn="l"/>
+              </a:tabLst>
+            </a:pPr>
+            <a:r>
+              <a:rPr sz="2400" spc="-10" dirty="0">
+                <a:latin typeface="Times New Roman"/>
+                <a:cs typeface="Times New Roman"/>
+              </a:rPr>
+              <a:t>Abstract</a:t>
+            </a:r>
+            <a:endParaRPr sz="2400" dirty="0">
+              <a:latin typeface="Times New Roman"/>
+              <a:cs typeface="Times New Roman"/>
+            </a:endParaRPr>
+          </a:p>
+          <a:p>
+            <a:pPr marL="334010" indent="-321310">
+              <a:lnSpc>
+                <a:spcPct val="100000"/>
+              </a:lnSpc>
+              <a:spcBef>
+                <a:spcPts val="1205"/>
+              </a:spcBef>
+              <a:buSzPct val="43750"/>
+              <a:buFont typeface="Wingdings"/>
+              <a:buChar char=""/>
+              <a:tabLst>
+                <a:tab pos="334010" algn="l"/>
+              </a:tabLst>
+            </a:pPr>
+            <a:r>
+              <a:rPr sz="2400" spc="-10" dirty="0">
+                <a:latin typeface="Times New Roman"/>
+                <a:cs typeface="Times New Roman"/>
+              </a:rPr>
+              <a:t>Introduction</a:t>
+            </a:r>
+            <a:endParaRPr sz="2400" dirty="0">
+              <a:latin typeface="Times New Roman"/>
+              <a:cs typeface="Times New Roman"/>
+            </a:endParaRPr>
+          </a:p>
+          <a:p>
+            <a:pPr marL="334010" indent="-321310">
+              <a:lnSpc>
+                <a:spcPct val="100000"/>
+              </a:lnSpc>
+              <a:spcBef>
+                <a:spcPts val="1200"/>
+              </a:spcBef>
+              <a:buSzPct val="43750"/>
+              <a:buFont typeface="Wingdings"/>
+              <a:buChar char=""/>
+              <a:tabLst>
+                <a:tab pos="334010" algn="l"/>
+              </a:tabLst>
+            </a:pPr>
+            <a:r>
+              <a:rPr sz="2400" spc="-10" dirty="0">
+                <a:latin typeface="Times New Roman"/>
+                <a:cs typeface="Times New Roman"/>
+              </a:rPr>
+              <a:t>Objectives</a:t>
+            </a:r>
+            <a:endParaRPr sz="2400">
+              <a:latin typeface="Times New Roman"/>
+              <a:cs typeface="Times New Roman"/>
+            </a:endParaRPr>
+          </a:p>
+          <a:p>
+            <a:pPr marL="334010" indent="-321310">
+              <a:lnSpc>
+                <a:spcPct val="100000"/>
+              </a:lnSpc>
+              <a:spcBef>
+                <a:spcPts val="1200"/>
+              </a:spcBef>
+              <a:buSzPct val="43750"/>
+              <a:buFont typeface="Wingdings"/>
+              <a:buChar char=""/>
+              <a:tabLst>
+                <a:tab pos="334010" algn="l"/>
+              </a:tabLst>
+            </a:pPr>
+            <a:r>
+              <a:rPr sz="2400" dirty="0">
+                <a:latin typeface="Times New Roman"/>
+                <a:cs typeface="Times New Roman"/>
+              </a:rPr>
+              <a:t>Literature</a:t>
+            </a:r>
+            <a:r>
+              <a:rPr sz="2400" spc="-50" dirty="0">
+                <a:latin typeface="Times New Roman"/>
+                <a:cs typeface="Times New Roman"/>
+              </a:rPr>
+              <a:t> </a:t>
+            </a:r>
+            <a:r>
+              <a:rPr sz="2400" spc="-10" dirty="0">
+                <a:latin typeface="Times New Roman"/>
+                <a:cs typeface="Times New Roman"/>
+              </a:rPr>
+              <a:t>Review</a:t>
+            </a:r>
+            <a:endParaRPr sz="2400" dirty="0">
+              <a:latin typeface="Times New Roman"/>
+              <a:cs typeface="Times New Roman"/>
+            </a:endParaRPr>
+          </a:p>
+          <a:p>
+            <a:pPr marL="334010" indent="-321310">
+              <a:lnSpc>
+                <a:spcPct val="100000"/>
+              </a:lnSpc>
+              <a:spcBef>
+                <a:spcPts val="1200"/>
+              </a:spcBef>
+              <a:buSzPct val="43750"/>
+              <a:buFont typeface="Wingdings"/>
+              <a:buChar char=""/>
+              <a:tabLst>
+                <a:tab pos="334010" algn="l"/>
+              </a:tabLst>
+            </a:pPr>
+            <a:r>
+              <a:rPr sz="2400" dirty="0">
+                <a:latin typeface="Times New Roman"/>
+                <a:cs typeface="Times New Roman"/>
+              </a:rPr>
+              <a:t>Research</a:t>
+            </a:r>
+            <a:r>
+              <a:rPr sz="2400" spc="-20" dirty="0">
+                <a:latin typeface="Times New Roman"/>
+                <a:cs typeface="Times New Roman"/>
+              </a:rPr>
+              <a:t> </a:t>
+            </a:r>
+            <a:r>
+              <a:rPr sz="2400" spc="-25" dirty="0">
+                <a:latin typeface="Times New Roman"/>
+                <a:cs typeface="Times New Roman"/>
+              </a:rPr>
+              <a:t>Gap</a:t>
+            </a:r>
+            <a:endParaRPr sz="2400" dirty="0">
+              <a:latin typeface="Times New Roman"/>
+              <a:cs typeface="Times New Roman"/>
+            </a:endParaRPr>
+          </a:p>
+          <a:p>
+            <a:pPr marL="334010" indent="-321310">
+              <a:lnSpc>
+                <a:spcPct val="100000"/>
+              </a:lnSpc>
+              <a:spcBef>
+                <a:spcPts val="1200"/>
+              </a:spcBef>
+              <a:buSzPct val="43750"/>
+              <a:buFont typeface="Wingdings"/>
+              <a:buChar char=""/>
+              <a:tabLst>
+                <a:tab pos="334010" algn="l"/>
+              </a:tabLst>
+            </a:pPr>
+            <a:r>
+              <a:rPr sz="2400" dirty="0">
+                <a:latin typeface="Times New Roman"/>
+                <a:cs typeface="Times New Roman"/>
+              </a:rPr>
+              <a:t>Problem</a:t>
+            </a:r>
+            <a:r>
+              <a:rPr sz="2400" spc="-20" dirty="0">
+                <a:latin typeface="Times New Roman"/>
+                <a:cs typeface="Times New Roman"/>
+              </a:rPr>
+              <a:t> </a:t>
+            </a:r>
+            <a:r>
+              <a:rPr sz="2400" spc="-10" dirty="0">
+                <a:latin typeface="Times New Roman"/>
+                <a:cs typeface="Times New Roman"/>
+              </a:rPr>
+              <a:t>Definition</a:t>
+            </a:r>
+            <a:endParaRPr sz="2400" dirty="0">
+              <a:latin typeface="Times New Roman"/>
+              <a:cs typeface="Times New Roman"/>
+            </a:endParaRPr>
+          </a:p>
+          <a:p>
+            <a:pPr marL="334010" indent="-321310">
+              <a:lnSpc>
+                <a:spcPct val="100000"/>
+              </a:lnSpc>
+              <a:spcBef>
+                <a:spcPts val="1200"/>
+              </a:spcBef>
+              <a:buSzPct val="43750"/>
+              <a:buFont typeface="Wingdings"/>
+              <a:buChar char=""/>
+              <a:tabLst>
+                <a:tab pos="334010" algn="l"/>
+              </a:tabLst>
+            </a:pPr>
+            <a:r>
+              <a:rPr sz="2400" spc="-10" dirty="0">
+                <a:latin typeface="Times New Roman"/>
+                <a:cs typeface="Times New Roman"/>
+              </a:rPr>
+              <a:t>Scope</a:t>
+            </a:r>
+            <a:endParaRPr sz="2400" dirty="0">
+              <a:latin typeface="Times New Roman"/>
+              <a:cs typeface="Times New Roman"/>
+            </a:endParaRPr>
+          </a:p>
+          <a:p>
+            <a:pPr marL="334010" indent="-321310">
+              <a:lnSpc>
+                <a:spcPct val="100000"/>
+              </a:lnSpc>
+              <a:spcBef>
+                <a:spcPts val="1190"/>
+              </a:spcBef>
+              <a:buSzPct val="43750"/>
+              <a:buFont typeface="Wingdings"/>
+              <a:buChar char=""/>
+              <a:tabLst>
+                <a:tab pos="334010" algn="l"/>
+              </a:tabLst>
+            </a:pPr>
+            <a:r>
+              <a:rPr sz="2400" spc="-10" dirty="0">
+                <a:latin typeface="Times New Roman"/>
+                <a:cs typeface="Times New Roman"/>
+              </a:rPr>
+              <a:t>Technological</a:t>
+            </a:r>
+            <a:r>
+              <a:rPr sz="2400" spc="-80" dirty="0">
+                <a:latin typeface="Times New Roman"/>
+                <a:cs typeface="Times New Roman"/>
+              </a:rPr>
+              <a:t> </a:t>
+            </a:r>
+            <a:r>
+              <a:rPr sz="2400" spc="-10" dirty="0">
+                <a:latin typeface="Times New Roman"/>
+                <a:cs typeface="Times New Roman"/>
+              </a:rPr>
+              <a:t>Stack</a:t>
+            </a:r>
+            <a:endParaRPr sz="2400" dirty="0">
+              <a:latin typeface="Times New Roman"/>
+              <a:cs typeface="Times New Roman"/>
+            </a:endParaRPr>
+          </a:p>
+          <a:p>
+            <a:pPr marL="334010" indent="-321310">
+              <a:lnSpc>
+                <a:spcPct val="100000"/>
+              </a:lnSpc>
+              <a:spcBef>
+                <a:spcPts val="1200"/>
+              </a:spcBef>
+              <a:buSzPct val="43750"/>
+              <a:buFont typeface="Wingdings"/>
+              <a:buChar char=""/>
+              <a:tabLst>
+                <a:tab pos="334010" algn="l"/>
+              </a:tabLst>
+            </a:pPr>
+            <a:r>
+              <a:rPr sz="2400" dirty="0">
+                <a:latin typeface="Times New Roman"/>
+                <a:cs typeface="Times New Roman"/>
+              </a:rPr>
+              <a:t>Proposed</a:t>
+            </a:r>
+            <a:r>
+              <a:rPr sz="2400" spc="-70" dirty="0">
+                <a:latin typeface="Times New Roman"/>
+                <a:cs typeface="Times New Roman"/>
+              </a:rPr>
+              <a:t> </a:t>
+            </a:r>
+            <a:r>
+              <a:rPr sz="2400" spc="-10" dirty="0">
+                <a:latin typeface="Times New Roman"/>
+                <a:cs typeface="Times New Roman"/>
+              </a:rPr>
+              <a:t>System</a:t>
+            </a:r>
+            <a:r>
+              <a:rPr sz="2400" spc="-150" dirty="0">
+                <a:latin typeface="Times New Roman"/>
+                <a:cs typeface="Times New Roman"/>
+              </a:rPr>
+              <a:t> </a:t>
+            </a:r>
+            <a:r>
+              <a:rPr sz="2400" spc="-10" dirty="0">
+                <a:latin typeface="Times New Roman"/>
+                <a:cs typeface="Times New Roman"/>
+              </a:rPr>
+              <a:t>Architecture/Working</a:t>
+            </a:r>
+            <a:endParaRPr sz="2400" dirty="0">
+              <a:latin typeface="Times New Roman"/>
+              <a:cs typeface="Times New Roman"/>
+            </a:endParaRPr>
+          </a:p>
+          <a:p>
+            <a:pPr marL="334010" indent="-321310">
+              <a:lnSpc>
+                <a:spcPct val="100000"/>
+              </a:lnSpc>
+              <a:spcBef>
+                <a:spcPts val="1200"/>
+              </a:spcBef>
+              <a:buSzPct val="43750"/>
+              <a:buFont typeface="Wingdings"/>
+              <a:buChar char=""/>
+              <a:tabLst>
+                <a:tab pos="334010" algn="l"/>
+              </a:tabLst>
+            </a:pPr>
+            <a:r>
+              <a:rPr sz="2400" dirty="0">
+                <a:latin typeface="Times New Roman"/>
+                <a:cs typeface="Times New Roman"/>
+              </a:rPr>
+              <a:t>Prototype</a:t>
+            </a:r>
+            <a:r>
+              <a:rPr sz="2400" spc="-55" dirty="0">
+                <a:latin typeface="Times New Roman"/>
+                <a:cs typeface="Times New Roman"/>
+              </a:rPr>
+              <a:t> </a:t>
+            </a:r>
+            <a:r>
+              <a:rPr sz="2400" dirty="0">
+                <a:latin typeface="Times New Roman"/>
+                <a:cs typeface="Times New Roman"/>
+              </a:rPr>
+              <a:t>Design</a:t>
+            </a:r>
+            <a:r>
+              <a:rPr sz="2400" spc="-35" dirty="0">
+                <a:latin typeface="Times New Roman"/>
+                <a:cs typeface="Times New Roman"/>
+              </a:rPr>
+              <a:t> </a:t>
+            </a:r>
+            <a:r>
+              <a:rPr sz="2400" spc="-10" dirty="0">
+                <a:latin typeface="Times New Roman"/>
+                <a:cs typeface="Times New Roman"/>
+              </a:rPr>
+              <a:t>Demonstration</a:t>
+            </a:r>
+            <a:endParaRPr sz="2400" dirty="0">
+              <a:latin typeface="Times New Roman"/>
+              <a:cs typeface="Times New Roman"/>
+            </a:endParaRPr>
+          </a:p>
+          <a:p>
+            <a:pPr marL="334010" indent="-321310">
+              <a:lnSpc>
+                <a:spcPct val="100000"/>
+              </a:lnSpc>
+              <a:spcBef>
+                <a:spcPts val="1200"/>
+              </a:spcBef>
+              <a:buSzPct val="43750"/>
+              <a:buFont typeface="Wingdings"/>
+              <a:buChar char=""/>
+              <a:tabLst>
+                <a:tab pos="334010" algn="l"/>
+              </a:tabLst>
+            </a:pPr>
+            <a:r>
+              <a:rPr sz="2400" dirty="0">
+                <a:latin typeface="Times New Roman"/>
+                <a:cs typeface="Times New Roman"/>
+              </a:rPr>
+              <a:t>Implementation</a:t>
+            </a:r>
+            <a:r>
+              <a:rPr sz="2400" spc="-45" dirty="0">
+                <a:latin typeface="Times New Roman"/>
+                <a:cs typeface="Times New Roman"/>
+              </a:rPr>
+              <a:t> </a:t>
+            </a:r>
+            <a:r>
+              <a:rPr sz="2400" spc="-10" dirty="0">
+                <a:latin typeface="Times New Roman"/>
+                <a:cs typeface="Times New Roman"/>
+              </a:rPr>
+              <a:t>Status</a:t>
+            </a:r>
+            <a:endParaRPr sz="2400" dirty="0">
+              <a:latin typeface="Times New Roman"/>
+              <a:cs typeface="Times New Roman"/>
+            </a:endParaRPr>
+          </a:p>
+          <a:p>
+            <a:pPr marL="334010" indent="-321310">
+              <a:lnSpc>
+                <a:spcPct val="100000"/>
+              </a:lnSpc>
+              <a:spcBef>
+                <a:spcPts val="1200"/>
+              </a:spcBef>
+              <a:buSzPct val="43750"/>
+              <a:buFont typeface="Wingdings"/>
+              <a:buChar char=""/>
+              <a:tabLst>
+                <a:tab pos="334010" algn="l"/>
+              </a:tabLst>
+            </a:pPr>
+            <a:r>
+              <a:rPr sz="2400" dirty="0">
+                <a:latin typeface="Times New Roman"/>
+                <a:cs typeface="Times New Roman"/>
+              </a:rPr>
+              <a:t>Review</a:t>
+            </a:r>
+            <a:r>
+              <a:rPr sz="2400" spc="-15" dirty="0">
+                <a:latin typeface="Times New Roman"/>
+                <a:cs typeface="Times New Roman"/>
+              </a:rPr>
+              <a:t> </a:t>
+            </a:r>
+            <a:r>
+              <a:rPr sz="2400" spc="-10" dirty="0">
+                <a:latin typeface="Times New Roman"/>
+                <a:cs typeface="Times New Roman"/>
+              </a:rPr>
+              <a:t>Suggestions</a:t>
+            </a:r>
+            <a:endParaRPr sz="2400" dirty="0">
+              <a:latin typeface="Times New Roman"/>
+              <a:cs typeface="Times New Roman"/>
+            </a:endParaRPr>
+          </a:p>
+        </p:txBody>
+      </p:sp>
+    </p:spTree>
+  </p:cSld>
+  <p:clrMapOvr>
+    <a:masterClrMapping/>
+  </p:clrMapOvr>
+</p:sld>
+</file>
+
+<file path=ppt/slides/slide20.xml><?xml version="1.0" encoding="utf-8"?>
 <p:sld xmlns:a="http://schemas.openxmlformats.org/drawingml/2006/main" xmlns:r="http://schemas.openxmlformats.org/officeDocument/2006/relationships" xmlns:p="http://schemas.openxmlformats.org/presentationml/2006/main">
   <p:cSld>
     <p:spTree>
@@ -15019,7 +15649,7 @@
 </p:sld>
 </file>
 
-<file path=ppt/slides/slide19.xml><?xml version="1.0" encoding="utf-8"?>
+<file path=ppt/slides/slide21.xml><?xml version="1.0" encoding="utf-8"?>
 <p:sld xmlns:a="http://schemas.openxmlformats.org/drawingml/2006/main" xmlns:r="http://schemas.openxmlformats.org/officeDocument/2006/relationships" xmlns:p="http://schemas.openxmlformats.org/presentationml/2006/main">
   <p:cSld>
     <p:spTree>
@@ -15242,558 +15872,7 @@
 </p:sld>
 </file>
 
-<file path=ppt/slides/slide2.xml><?xml version="1.0" encoding="utf-8"?>
-<p:sld xmlns:a="http://schemas.openxmlformats.org/drawingml/2006/main" xmlns:r="http://schemas.openxmlformats.org/officeDocument/2006/relationships" xmlns:p="http://schemas.openxmlformats.org/presentationml/2006/main">
-  <p:cSld>
-    <p:spTree>
-      <p:nvGrpSpPr>
-        <p:cNvPr id="1" name=""/>
-        <p:cNvGrpSpPr/>
-        <p:nvPr/>
-      </p:nvGrpSpPr>
-      <p:grpSpPr>
-        <a:xfrm>
-          <a:off x="0" y="0"/>
-          <a:ext cx="0" cy="0"/>
-          <a:chOff x="0" y="0"/>
-          <a:chExt cx="0" cy="0"/>
-        </a:xfrm>
-      </p:grpSpPr>
-      <p:sp>
-        <p:nvSpPr>
-          <p:cNvPr id="2" name="object 2"/>
-          <p:cNvSpPr txBox="1">
-            <a:spLocks noGrp="1"/>
-          </p:cNvSpPr>
-          <p:nvPr>
-            <p:ph type="title"/>
-          </p:nvPr>
-        </p:nvSpPr>
-        <p:spPr>
-          <a:xfrm>
-            <a:off x="4150233" y="368046"/>
-            <a:ext cx="1779270" cy="574040"/>
-          </a:xfrm>
-          <a:prstGeom prst="rect">
-            <a:avLst/>
-          </a:prstGeom>
-        </p:spPr>
-        <p:txBody>
-          <a:bodyPr vert="horz" wrap="square" lIns="0" tIns="12700" rIns="0" bIns="0" rtlCol="0">
-            <a:spAutoFit/>
-          </a:bodyPr>
-          <a:lstStyle/>
-          <a:p>
-            <a:pPr marL="12700">
-              <a:lnSpc>
-                <a:spcPct val="100000"/>
-              </a:lnSpc>
-              <a:spcBef>
-                <a:spcPts val="100"/>
-              </a:spcBef>
-            </a:pPr>
-            <a:r>
-              <a:rPr spc="-10" dirty="0"/>
-              <a:t>Contents</a:t>
-            </a:r>
-          </a:p>
-        </p:txBody>
-      </p:sp>
-      <p:sp>
-        <p:nvSpPr>
-          <p:cNvPr id="3" name="object 3"/>
-          <p:cNvSpPr txBox="1"/>
-          <p:nvPr/>
-        </p:nvSpPr>
-        <p:spPr>
-          <a:xfrm>
-            <a:off x="597204" y="1020683"/>
-            <a:ext cx="5179695" cy="6243955"/>
-          </a:xfrm>
-          <a:prstGeom prst="rect">
-            <a:avLst/>
-          </a:prstGeom>
-        </p:spPr>
-        <p:txBody>
-          <a:bodyPr vert="horz" wrap="square" lIns="0" tIns="165735" rIns="0" bIns="0" rtlCol="0">
-            <a:spAutoFit/>
-          </a:bodyPr>
-          <a:lstStyle/>
-          <a:p>
-            <a:pPr marL="334010" indent="-321310">
-              <a:lnSpc>
-                <a:spcPct val="100000"/>
-              </a:lnSpc>
-              <a:spcBef>
-                <a:spcPts val="1305"/>
-              </a:spcBef>
-              <a:buSzPct val="43750"/>
-              <a:buFont typeface="Wingdings"/>
-              <a:buChar char=""/>
-              <a:tabLst>
-                <a:tab pos="334010" algn="l"/>
-              </a:tabLst>
-            </a:pPr>
-            <a:r>
-              <a:rPr sz="2400" spc="-10" dirty="0">
-                <a:latin typeface="Times New Roman"/>
-                <a:cs typeface="Times New Roman"/>
-              </a:rPr>
-              <a:t>Abstract</a:t>
-            </a:r>
-            <a:endParaRPr sz="2400" dirty="0">
-              <a:latin typeface="Times New Roman"/>
-              <a:cs typeface="Times New Roman"/>
-            </a:endParaRPr>
-          </a:p>
-          <a:p>
-            <a:pPr marL="334010" indent="-321310">
-              <a:lnSpc>
-                <a:spcPct val="100000"/>
-              </a:lnSpc>
-              <a:spcBef>
-                <a:spcPts val="1205"/>
-              </a:spcBef>
-              <a:buSzPct val="43750"/>
-              <a:buFont typeface="Wingdings"/>
-              <a:buChar char=""/>
-              <a:tabLst>
-                <a:tab pos="334010" algn="l"/>
-              </a:tabLst>
-            </a:pPr>
-            <a:r>
-              <a:rPr sz="2400" spc="-10" dirty="0">
-                <a:latin typeface="Times New Roman"/>
-                <a:cs typeface="Times New Roman"/>
-              </a:rPr>
-              <a:t>Introduction</a:t>
-            </a:r>
-            <a:endParaRPr sz="2400" dirty="0">
-              <a:latin typeface="Times New Roman"/>
-              <a:cs typeface="Times New Roman"/>
-            </a:endParaRPr>
-          </a:p>
-          <a:p>
-            <a:pPr marL="334010" indent="-321310">
-              <a:lnSpc>
-                <a:spcPct val="100000"/>
-              </a:lnSpc>
-              <a:spcBef>
-                <a:spcPts val="1200"/>
-              </a:spcBef>
-              <a:buSzPct val="43750"/>
-              <a:buFont typeface="Wingdings"/>
-              <a:buChar char=""/>
-              <a:tabLst>
-                <a:tab pos="334010" algn="l"/>
-              </a:tabLst>
-            </a:pPr>
-            <a:r>
-              <a:rPr sz="2400" spc="-10" dirty="0">
-                <a:latin typeface="Times New Roman"/>
-                <a:cs typeface="Times New Roman"/>
-              </a:rPr>
-              <a:t>Objectives</a:t>
-            </a:r>
-            <a:endParaRPr sz="2400">
-              <a:latin typeface="Times New Roman"/>
-              <a:cs typeface="Times New Roman"/>
-            </a:endParaRPr>
-          </a:p>
-          <a:p>
-            <a:pPr marL="334010" indent="-321310">
-              <a:lnSpc>
-                <a:spcPct val="100000"/>
-              </a:lnSpc>
-              <a:spcBef>
-                <a:spcPts val="1200"/>
-              </a:spcBef>
-              <a:buSzPct val="43750"/>
-              <a:buFont typeface="Wingdings"/>
-              <a:buChar char=""/>
-              <a:tabLst>
-                <a:tab pos="334010" algn="l"/>
-              </a:tabLst>
-            </a:pPr>
-            <a:r>
-              <a:rPr sz="2400" dirty="0">
-                <a:latin typeface="Times New Roman"/>
-                <a:cs typeface="Times New Roman"/>
-              </a:rPr>
-              <a:t>Literature</a:t>
-            </a:r>
-            <a:r>
-              <a:rPr sz="2400" spc="-50" dirty="0">
-                <a:latin typeface="Times New Roman"/>
-                <a:cs typeface="Times New Roman"/>
-              </a:rPr>
-              <a:t> </a:t>
-            </a:r>
-            <a:r>
-              <a:rPr sz="2400" spc="-10" dirty="0">
-                <a:latin typeface="Times New Roman"/>
-                <a:cs typeface="Times New Roman"/>
-              </a:rPr>
-              <a:t>Review</a:t>
-            </a:r>
-            <a:endParaRPr sz="2400" dirty="0">
-              <a:latin typeface="Times New Roman"/>
-              <a:cs typeface="Times New Roman"/>
-            </a:endParaRPr>
-          </a:p>
-          <a:p>
-            <a:pPr marL="334010" indent="-321310">
-              <a:lnSpc>
-                <a:spcPct val="100000"/>
-              </a:lnSpc>
-              <a:spcBef>
-                <a:spcPts val="1200"/>
-              </a:spcBef>
-              <a:buSzPct val="43750"/>
-              <a:buFont typeface="Wingdings"/>
-              <a:buChar char=""/>
-              <a:tabLst>
-                <a:tab pos="334010" algn="l"/>
-              </a:tabLst>
-            </a:pPr>
-            <a:r>
-              <a:rPr sz="2400" dirty="0">
-                <a:latin typeface="Times New Roman"/>
-                <a:cs typeface="Times New Roman"/>
-              </a:rPr>
-              <a:t>Research</a:t>
-            </a:r>
-            <a:r>
-              <a:rPr sz="2400" spc="-20" dirty="0">
-                <a:latin typeface="Times New Roman"/>
-                <a:cs typeface="Times New Roman"/>
-              </a:rPr>
-              <a:t> </a:t>
-            </a:r>
-            <a:r>
-              <a:rPr sz="2400" spc="-25" dirty="0">
-                <a:latin typeface="Times New Roman"/>
-                <a:cs typeface="Times New Roman"/>
-              </a:rPr>
-              <a:t>Gap</a:t>
-            </a:r>
-            <a:endParaRPr sz="2400" dirty="0">
-              <a:latin typeface="Times New Roman"/>
-              <a:cs typeface="Times New Roman"/>
-            </a:endParaRPr>
-          </a:p>
-          <a:p>
-            <a:pPr marL="334010" indent="-321310">
-              <a:lnSpc>
-                <a:spcPct val="100000"/>
-              </a:lnSpc>
-              <a:spcBef>
-                <a:spcPts val="1200"/>
-              </a:spcBef>
-              <a:buSzPct val="43750"/>
-              <a:buFont typeface="Wingdings"/>
-              <a:buChar char=""/>
-              <a:tabLst>
-                <a:tab pos="334010" algn="l"/>
-              </a:tabLst>
-            </a:pPr>
-            <a:r>
-              <a:rPr sz="2400" dirty="0">
-                <a:latin typeface="Times New Roman"/>
-                <a:cs typeface="Times New Roman"/>
-              </a:rPr>
-              <a:t>Problem</a:t>
-            </a:r>
-            <a:r>
-              <a:rPr sz="2400" spc="-20" dirty="0">
-                <a:latin typeface="Times New Roman"/>
-                <a:cs typeface="Times New Roman"/>
-              </a:rPr>
-              <a:t> </a:t>
-            </a:r>
-            <a:r>
-              <a:rPr sz="2400" spc="-10" dirty="0">
-                <a:latin typeface="Times New Roman"/>
-                <a:cs typeface="Times New Roman"/>
-              </a:rPr>
-              <a:t>Definition</a:t>
-            </a:r>
-            <a:endParaRPr sz="2400" dirty="0">
-              <a:latin typeface="Times New Roman"/>
-              <a:cs typeface="Times New Roman"/>
-            </a:endParaRPr>
-          </a:p>
-          <a:p>
-            <a:pPr marL="334010" indent="-321310">
-              <a:lnSpc>
-                <a:spcPct val="100000"/>
-              </a:lnSpc>
-              <a:spcBef>
-                <a:spcPts val="1200"/>
-              </a:spcBef>
-              <a:buSzPct val="43750"/>
-              <a:buFont typeface="Wingdings"/>
-              <a:buChar char=""/>
-              <a:tabLst>
-                <a:tab pos="334010" algn="l"/>
-              </a:tabLst>
-            </a:pPr>
-            <a:r>
-              <a:rPr sz="2400" spc="-10" dirty="0">
-                <a:latin typeface="Times New Roman"/>
-                <a:cs typeface="Times New Roman"/>
-              </a:rPr>
-              <a:t>Scope</a:t>
-            </a:r>
-            <a:endParaRPr sz="2400" dirty="0">
-              <a:latin typeface="Times New Roman"/>
-              <a:cs typeface="Times New Roman"/>
-            </a:endParaRPr>
-          </a:p>
-          <a:p>
-            <a:pPr marL="334010" indent="-321310">
-              <a:lnSpc>
-                <a:spcPct val="100000"/>
-              </a:lnSpc>
-              <a:spcBef>
-                <a:spcPts val="1190"/>
-              </a:spcBef>
-              <a:buSzPct val="43750"/>
-              <a:buFont typeface="Wingdings"/>
-              <a:buChar char=""/>
-              <a:tabLst>
-                <a:tab pos="334010" algn="l"/>
-              </a:tabLst>
-            </a:pPr>
-            <a:r>
-              <a:rPr sz="2400" spc="-10" dirty="0">
-                <a:latin typeface="Times New Roman"/>
-                <a:cs typeface="Times New Roman"/>
-              </a:rPr>
-              <a:t>Technological</a:t>
-            </a:r>
-            <a:r>
-              <a:rPr sz="2400" spc="-80" dirty="0">
-                <a:latin typeface="Times New Roman"/>
-                <a:cs typeface="Times New Roman"/>
-              </a:rPr>
-              <a:t> </a:t>
-            </a:r>
-            <a:r>
-              <a:rPr sz="2400" spc="-10" dirty="0">
-                <a:latin typeface="Times New Roman"/>
-                <a:cs typeface="Times New Roman"/>
-              </a:rPr>
-              <a:t>Stack</a:t>
-            </a:r>
-            <a:endParaRPr sz="2400" dirty="0">
-              <a:latin typeface="Times New Roman"/>
-              <a:cs typeface="Times New Roman"/>
-            </a:endParaRPr>
-          </a:p>
-          <a:p>
-            <a:pPr marL="334010" indent="-321310">
-              <a:lnSpc>
-                <a:spcPct val="100000"/>
-              </a:lnSpc>
-              <a:spcBef>
-                <a:spcPts val="1200"/>
-              </a:spcBef>
-              <a:buSzPct val="43750"/>
-              <a:buFont typeface="Wingdings"/>
-              <a:buChar char=""/>
-              <a:tabLst>
-                <a:tab pos="334010" algn="l"/>
-              </a:tabLst>
-            </a:pPr>
-            <a:r>
-              <a:rPr sz="2400" dirty="0">
-                <a:latin typeface="Times New Roman"/>
-                <a:cs typeface="Times New Roman"/>
-              </a:rPr>
-              <a:t>Proposed</a:t>
-            </a:r>
-            <a:r>
-              <a:rPr sz="2400" spc="-70" dirty="0">
-                <a:latin typeface="Times New Roman"/>
-                <a:cs typeface="Times New Roman"/>
-              </a:rPr>
-              <a:t> </a:t>
-            </a:r>
-            <a:r>
-              <a:rPr sz="2400" spc="-10" dirty="0">
-                <a:latin typeface="Times New Roman"/>
-                <a:cs typeface="Times New Roman"/>
-              </a:rPr>
-              <a:t>System</a:t>
-            </a:r>
-            <a:r>
-              <a:rPr sz="2400" spc="-150" dirty="0">
-                <a:latin typeface="Times New Roman"/>
-                <a:cs typeface="Times New Roman"/>
-              </a:rPr>
-              <a:t> </a:t>
-            </a:r>
-            <a:r>
-              <a:rPr sz="2400" spc="-10" dirty="0">
-                <a:latin typeface="Times New Roman"/>
-                <a:cs typeface="Times New Roman"/>
-              </a:rPr>
-              <a:t>Architecture/Working</a:t>
-            </a:r>
-            <a:endParaRPr sz="2400" dirty="0">
-              <a:latin typeface="Times New Roman"/>
-              <a:cs typeface="Times New Roman"/>
-            </a:endParaRPr>
-          </a:p>
-          <a:p>
-            <a:pPr marL="334010" indent="-321310">
-              <a:lnSpc>
-                <a:spcPct val="100000"/>
-              </a:lnSpc>
-              <a:spcBef>
-                <a:spcPts val="1200"/>
-              </a:spcBef>
-              <a:buSzPct val="43750"/>
-              <a:buFont typeface="Wingdings"/>
-              <a:buChar char=""/>
-              <a:tabLst>
-                <a:tab pos="334010" algn="l"/>
-              </a:tabLst>
-            </a:pPr>
-            <a:r>
-              <a:rPr sz="2400" dirty="0">
-                <a:latin typeface="Times New Roman"/>
-                <a:cs typeface="Times New Roman"/>
-              </a:rPr>
-              <a:t>Prototype</a:t>
-            </a:r>
-            <a:r>
-              <a:rPr sz="2400" spc="-55" dirty="0">
-                <a:latin typeface="Times New Roman"/>
-                <a:cs typeface="Times New Roman"/>
-              </a:rPr>
-              <a:t> </a:t>
-            </a:r>
-            <a:r>
-              <a:rPr sz="2400" dirty="0">
-                <a:latin typeface="Times New Roman"/>
-                <a:cs typeface="Times New Roman"/>
-              </a:rPr>
-              <a:t>Design</a:t>
-            </a:r>
-            <a:r>
-              <a:rPr sz="2400" spc="-35" dirty="0">
-                <a:latin typeface="Times New Roman"/>
-                <a:cs typeface="Times New Roman"/>
-              </a:rPr>
-              <a:t> </a:t>
-            </a:r>
-            <a:r>
-              <a:rPr sz="2400" spc="-10" dirty="0">
-                <a:latin typeface="Times New Roman"/>
-                <a:cs typeface="Times New Roman"/>
-              </a:rPr>
-              <a:t>Demonstration</a:t>
-            </a:r>
-            <a:endParaRPr sz="2400" dirty="0">
-              <a:latin typeface="Times New Roman"/>
-              <a:cs typeface="Times New Roman"/>
-            </a:endParaRPr>
-          </a:p>
-          <a:p>
-            <a:pPr marL="334010" indent="-321310">
-              <a:lnSpc>
-                <a:spcPct val="100000"/>
-              </a:lnSpc>
-              <a:spcBef>
-                <a:spcPts val="1200"/>
-              </a:spcBef>
-              <a:buSzPct val="43750"/>
-              <a:buFont typeface="Wingdings"/>
-              <a:buChar char=""/>
-              <a:tabLst>
-                <a:tab pos="334010" algn="l"/>
-              </a:tabLst>
-            </a:pPr>
-            <a:r>
-              <a:rPr sz="2400" dirty="0">
-                <a:latin typeface="Times New Roman"/>
-                <a:cs typeface="Times New Roman"/>
-              </a:rPr>
-              <a:t>Implementation</a:t>
-            </a:r>
-            <a:r>
-              <a:rPr sz="2400" spc="-45" dirty="0">
-                <a:latin typeface="Times New Roman"/>
-                <a:cs typeface="Times New Roman"/>
-              </a:rPr>
-              <a:t> </a:t>
-            </a:r>
-            <a:r>
-              <a:rPr sz="2400" spc="-10" dirty="0">
-                <a:latin typeface="Times New Roman"/>
-                <a:cs typeface="Times New Roman"/>
-              </a:rPr>
-              <a:t>Status</a:t>
-            </a:r>
-            <a:endParaRPr sz="2400" dirty="0">
-              <a:latin typeface="Times New Roman"/>
-              <a:cs typeface="Times New Roman"/>
-            </a:endParaRPr>
-          </a:p>
-          <a:p>
-            <a:pPr marL="334010" indent="-321310">
-              <a:lnSpc>
-                <a:spcPct val="100000"/>
-              </a:lnSpc>
-              <a:spcBef>
-                <a:spcPts val="1200"/>
-              </a:spcBef>
-              <a:buSzPct val="43750"/>
-              <a:buFont typeface="Wingdings"/>
-              <a:buChar char=""/>
-              <a:tabLst>
-                <a:tab pos="334010" algn="l"/>
-              </a:tabLst>
-            </a:pPr>
-            <a:r>
-              <a:rPr sz="2400" dirty="0">
-                <a:latin typeface="Times New Roman"/>
-                <a:cs typeface="Times New Roman"/>
-              </a:rPr>
-              <a:t>Review</a:t>
-            </a:r>
-            <a:r>
-              <a:rPr sz="2400" spc="-15" dirty="0">
-                <a:latin typeface="Times New Roman"/>
-                <a:cs typeface="Times New Roman"/>
-              </a:rPr>
-              <a:t> </a:t>
-            </a:r>
-            <a:r>
-              <a:rPr sz="2400" spc="-10" dirty="0">
-                <a:latin typeface="Times New Roman"/>
-                <a:cs typeface="Times New Roman"/>
-              </a:rPr>
-              <a:t>Suggestions</a:t>
-            </a:r>
-            <a:endParaRPr sz="2400" dirty="0">
-              <a:latin typeface="Times New Roman"/>
-              <a:cs typeface="Times New Roman"/>
-            </a:endParaRPr>
-          </a:p>
-        </p:txBody>
-      </p:sp>
-    </p:spTree>
-  </p:cSld>
-  <p:clrMapOvr>
-    <a:masterClrMapping/>
-  </p:clrMapOvr>
-</p:sld>
-</file>
-
-<file path=ppt/slides/slide20.xml><?xml version="1.0" encoding="utf-8"?>
+<file path=ppt/slides/slide22.xml><?xml version="1.0" encoding="utf-8"?>
 <p:sld xmlns:a="http://schemas.openxmlformats.org/drawingml/2006/main" xmlns:r="http://schemas.openxmlformats.org/officeDocument/2006/relationships" xmlns:p="http://schemas.openxmlformats.org/presentationml/2006/main">
   <p:cSld>
     <p:spTree>
@@ -15887,7 +15966,7 @@
 </p:sld>
 </file>
 
-<file path=ppt/slides/slide21.xml><?xml version="1.0" encoding="utf-8"?>
+<file path=ppt/slides/slide23.xml><?xml version="1.0" encoding="utf-8"?>
 <p:sld xmlns:a="http://schemas.openxmlformats.org/drawingml/2006/main" xmlns:r="http://schemas.openxmlformats.org/officeDocument/2006/relationships" xmlns:p="http://schemas.openxmlformats.org/presentationml/2006/main">
   <p:cSld>
     <p:spTree>
@@ -17710,7 +17789,7 @@
 </p:sld>
 </file>
 
-<file path=ppt/slides/slide22.xml><?xml version="1.0" encoding="utf-8"?>
+<file path=ppt/slides/slide24.xml><?xml version="1.0" encoding="utf-8"?>
 <p:sld xmlns:a="http://schemas.openxmlformats.org/drawingml/2006/main" xmlns:r="http://schemas.openxmlformats.org/officeDocument/2006/relationships" xmlns:p="http://schemas.openxmlformats.org/presentationml/2006/main">
   <p:cSld>
     <p:spTree>
@@ -20614,7 +20693,7 @@
 </p:sld>
 </file>
 
-<file path=ppt/slides/slide23.xml><?xml version="1.0" encoding="utf-8"?>
+<file path=ppt/slides/slide25.xml><?xml version="1.0" encoding="utf-8"?>
 <p:sld xmlns:a="http://schemas.openxmlformats.org/drawingml/2006/main" xmlns:r="http://schemas.openxmlformats.org/officeDocument/2006/relationships" xmlns:p="http://schemas.openxmlformats.org/presentationml/2006/main">
   <p:cSld>
     <p:spTree>

</xml_diff>